<commit_message>
Added selection options and updated mockup
</commit_message>
<xml_diff>
--- a/Resources/Mockup.pptx
+++ b/Resources/Mockup.pptx
@@ -123,27 +123,99 @@
 </p:presentation>
 </file>
 
+<file path=ppt/revisionInfo.xml><?xml version="1.0" encoding="utf-8"?>
+<p1510:revInfo xmlns:a="http://schemas.openxmlformats.org/drawingml/2006/main" xmlns:r="http://schemas.openxmlformats.org/officeDocument/2006/relationships" xmlns:p1510="http://schemas.microsoft.com/office/powerpoint/2015/10/main">
+  <p1510:revLst>
+    <p1510:client id="{BDAA89D7-5749-4282-9E8D-F0E1952C1927}" v="4" dt="2022-06-23T15:07:54.617"/>
+  </p1510:revLst>
+</p1510:revInfo>
+</file>
+
 <file path=ppt/changesInfos/changesInfo1.xml><?xml version="1.0" encoding="utf-8"?>
 <pc:chgInfo xmlns:a="http://schemas.openxmlformats.org/drawingml/2006/main" xmlns:r="http://schemas.openxmlformats.org/officeDocument/2006/relationships" xmlns:ac="http://schemas.microsoft.com/office/drawing/2013/main/command" xmlns:pc="http://schemas.microsoft.com/office/powerpoint/2013/main/command">
   <pc:docChgLst>
     <pc:chgData name="Chris and Marisa Shideler" userId="9fdb53cd27a090d0" providerId="LiveId" clId="{BDAA89D7-5749-4282-9E8D-F0E1952C1927}"/>
-    <pc:docChg chg="custSel modSld">
-      <pc:chgData name="Chris and Marisa Shideler" userId="9fdb53cd27a090d0" providerId="LiveId" clId="{BDAA89D7-5749-4282-9E8D-F0E1952C1927}" dt="2022-06-21T18:31:29.297" v="0" actId="478"/>
+    <pc:docChg chg="undo custSel modSld">
+      <pc:chgData name="Chris and Marisa Shideler" userId="9fdb53cd27a090d0" providerId="LiveId" clId="{BDAA89D7-5749-4282-9E8D-F0E1952C1927}" dt="2022-06-23T15:26:11.380" v="337" actId="1076"/>
       <pc:docMkLst>
         <pc:docMk/>
       </pc:docMkLst>
-      <pc:sldChg chg="delSp mod">
-        <pc:chgData name="Chris and Marisa Shideler" userId="9fdb53cd27a090d0" providerId="LiveId" clId="{BDAA89D7-5749-4282-9E8D-F0E1952C1927}" dt="2022-06-21T18:31:29.297" v="0" actId="478"/>
+      <pc:sldChg chg="addSp delSp modSp mod">
+        <pc:chgData name="Chris and Marisa Shideler" userId="9fdb53cd27a090d0" providerId="LiveId" clId="{BDAA89D7-5749-4282-9E8D-F0E1952C1927}" dt="2022-06-23T15:26:11.380" v="337" actId="1076"/>
         <pc:sldMkLst>
           <pc:docMk/>
           <pc:sldMk cId="1430935324" sldId="256"/>
         </pc:sldMkLst>
+        <pc:spChg chg="mod">
+          <ac:chgData name="Chris and Marisa Shideler" userId="9fdb53cd27a090d0" providerId="LiveId" clId="{BDAA89D7-5749-4282-9E8D-F0E1952C1927}" dt="2022-06-23T15:09:19.433" v="276" actId="6549"/>
+          <ac:spMkLst>
+            <pc:docMk/>
+            <pc:sldMk cId="1430935324" sldId="256"/>
+            <ac:spMk id="5" creationId="{E3D2B5C4-6142-F75E-7850-E67059C4DD13}"/>
+          </ac:spMkLst>
+        </pc:spChg>
+        <pc:spChg chg="mod">
+          <ac:chgData name="Chris and Marisa Shideler" userId="9fdb53cd27a090d0" providerId="LiveId" clId="{BDAA89D7-5749-4282-9E8D-F0E1952C1927}" dt="2022-06-23T15:10:40.412" v="311" actId="14100"/>
+          <ac:spMkLst>
+            <pc:docMk/>
+            <pc:sldMk cId="1430935324" sldId="256"/>
+            <ac:spMk id="6" creationId="{05B9FF3A-1FC2-6702-E18E-A392F74752F3}"/>
+          </ac:spMkLst>
+        </pc:spChg>
+        <pc:spChg chg="add del mod">
+          <ac:chgData name="Chris and Marisa Shideler" userId="9fdb53cd27a090d0" providerId="LiveId" clId="{BDAA89D7-5749-4282-9E8D-F0E1952C1927}" dt="2022-06-23T15:10:49.257" v="314" actId="1076"/>
+          <ac:spMkLst>
+            <pc:docMk/>
+            <pc:sldMk cId="1430935324" sldId="256"/>
+            <ac:spMk id="7" creationId="{FFFC4487-3653-2D84-44D5-7F7BF9A7AEEC}"/>
+          </ac:spMkLst>
+        </pc:spChg>
+        <pc:spChg chg="mod">
+          <ac:chgData name="Chris and Marisa Shideler" userId="9fdb53cd27a090d0" providerId="LiveId" clId="{BDAA89D7-5749-4282-9E8D-F0E1952C1927}" dt="2022-06-23T15:11:03.830" v="319" actId="1076"/>
+          <ac:spMkLst>
+            <pc:docMk/>
+            <pc:sldMk cId="1430935324" sldId="256"/>
+            <ac:spMk id="8" creationId="{5FF90F39-7B83-339D-4C79-D1519F52CA99}"/>
+          </ac:spMkLst>
+        </pc:spChg>
+        <pc:spChg chg="add mod">
+          <ac:chgData name="Chris and Marisa Shideler" userId="9fdb53cd27a090d0" providerId="LiveId" clId="{BDAA89D7-5749-4282-9E8D-F0E1952C1927}" dt="2022-06-23T15:26:11.380" v="337" actId="1076"/>
+          <ac:spMkLst>
+            <pc:docMk/>
+            <pc:sldMk cId="1430935324" sldId="256"/>
+            <ac:spMk id="9" creationId="{44B0FA42-7AC8-EBE1-7C70-81CDE9B94637}"/>
+          </ac:spMkLst>
+        </pc:spChg>
         <pc:spChg chg="del">
           <ac:chgData name="Chris and Marisa Shideler" userId="9fdb53cd27a090d0" providerId="LiveId" clId="{BDAA89D7-5749-4282-9E8D-F0E1952C1927}" dt="2022-06-21T18:31:29.297" v="0" actId="478"/>
           <ac:spMkLst>
             <pc:docMk/>
             <pc:sldMk cId="1430935324" sldId="256"/>
             <ac:spMk id="9" creationId="{EB079F0F-C83C-38F8-A0B2-72E227D321AC}"/>
+          </ac:spMkLst>
+        </pc:spChg>
+        <pc:spChg chg="add mod">
+          <ac:chgData name="Chris and Marisa Shideler" userId="9fdb53cd27a090d0" providerId="LiveId" clId="{BDAA89D7-5749-4282-9E8D-F0E1952C1927}" dt="2022-06-23T15:10:45.699" v="313" actId="1076"/>
+          <ac:spMkLst>
+            <pc:docMk/>
+            <pc:sldMk cId="1430935324" sldId="256"/>
+            <ac:spMk id="10" creationId="{48D31BD1-11D2-4ED6-CFE3-D352C9C02BA5}"/>
+          </ac:spMkLst>
+        </pc:spChg>
+        <pc:spChg chg="add mod">
+          <ac:chgData name="Chris and Marisa Shideler" userId="9fdb53cd27a090d0" providerId="LiveId" clId="{BDAA89D7-5749-4282-9E8D-F0E1952C1927}" dt="2022-06-23T15:10:42.937" v="312" actId="1076"/>
+          <ac:spMkLst>
+            <pc:docMk/>
+            <pc:sldMk cId="1430935324" sldId="256"/>
+            <ac:spMk id="11" creationId="{26EA380F-D5A3-2694-FBC5-992B761B3332}"/>
+          </ac:spMkLst>
+        </pc:spChg>
+        <pc:spChg chg="add mod">
+          <ac:chgData name="Chris and Marisa Shideler" userId="9fdb53cd27a090d0" providerId="LiveId" clId="{BDAA89D7-5749-4282-9E8D-F0E1952C1927}" dt="2022-06-23T15:11:01.030" v="318" actId="1076"/>
+          <ac:spMkLst>
+            <pc:docMk/>
+            <pc:sldMk cId="1430935324" sldId="256"/>
+            <ac:spMk id="12" creationId="{7E9D09D1-8FD0-AD21-CC60-38C2FCCC81B6}"/>
           </ac:spMkLst>
         </pc:spChg>
       </pc:sldChg>
@@ -299,7 +371,7 @@
           <a:p>
             <a:fld id="{05A04CA7-B65A-4CCC-B1AB-F0252503BBAA}" type="datetimeFigureOut">
               <a:rPr lang="en-US" smtClean="0"/>
-              <a:t>6/21/2022</a:t>
+              <a:t>6/22/2022</a:t>
             </a:fld>
             <a:endParaRPr lang="en-US"/>
           </a:p>
@@ -497,7 +569,7 @@
           <a:p>
             <a:fld id="{05A04CA7-B65A-4CCC-B1AB-F0252503BBAA}" type="datetimeFigureOut">
               <a:rPr lang="en-US" smtClean="0"/>
-              <a:t>6/21/2022</a:t>
+              <a:t>6/22/2022</a:t>
             </a:fld>
             <a:endParaRPr lang="en-US"/>
           </a:p>
@@ -705,7 +777,7 @@
           <a:p>
             <a:fld id="{05A04CA7-B65A-4CCC-B1AB-F0252503BBAA}" type="datetimeFigureOut">
               <a:rPr lang="en-US" smtClean="0"/>
-              <a:t>6/21/2022</a:t>
+              <a:t>6/22/2022</a:t>
             </a:fld>
             <a:endParaRPr lang="en-US"/>
           </a:p>
@@ -903,7 +975,7 @@
           <a:p>
             <a:fld id="{05A04CA7-B65A-4CCC-B1AB-F0252503BBAA}" type="datetimeFigureOut">
               <a:rPr lang="en-US" smtClean="0"/>
-              <a:t>6/21/2022</a:t>
+              <a:t>6/22/2022</a:t>
             </a:fld>
             <a:endParaRPr lang="en-US"/>
           </a:p>
@@ -1178,7 +1250,7 @@
           <a:p>
             <a:fld id="{05A04CA7-B65A-4CCC-B1AB-F0252503BBAA}" type="datetimeFigureOut">
               <a:rPr lang="en-US" smtClean="0"/>
-              <a:t>6/21/2022</a:t>
+              <a:t>6/22/2022</a:t>
             </a:fld>
             <a:endParaRPr lang="en-US"/>
           </a:p>
@@ -1443,7 +1515,7 @@
           <a:p>
             <a:fld id="{05A04CA7-B65A-4CCC-B1AB-F0252503BBAA}" type="datetimeFigureOut">
               <a:rPr lang="en-US" smtClean="0"/>
-              <a:t>6/21/2022</a:t>
+              <a:t>6/22/2022</a:t>
             </a:fld>
             <a:endParaRPr lang="en-US"/>
           </a:p>
@@ -1855,7 +1927,7 @@
           <a:p>
             <a:fld id="{05A04CA7-B65A-4CCC-B1AB-F0252503BBAA}" type="datetimeFigureOut">
               <a:rPr lang="en-US" smtClean="0"/>
-              <a:t>6/21/2022</a:t>
+              <a:t>6/22/2022</a:t>
             </a:fld>
             <a:endParaRPr lang="en-US"/>
           </a:p>
@@ -1996,7 +2068,7 @@
           <a:p>
             <a:fld id="{05A04CA7-B65A-4CCC-B1AB-F0252503BBAA}" type="datetimeFigureOut">
               <a:rPr lang="en-US" smtClean="0"/>
-              <a:t>6/21/2022</a:t>
+              <a:t>6/22/2022</a:t>
             </a:fld>
             <a:endParaRPr lang="en-US"/>
           </a:p>
@@ -2109,7 +2181,7 @@
           <a:p>
             <a:fld id="{05A04CA7-B65A-4CCC-B1AB-F0252503BBAA}" type="datetimeFigureOut">
               <a:rPr lang="en-US" smtClean="0"/>
-              <a:t>6/21/2022</a:t>
+              <a:t>6/22/2022</a:t>
             </a:fld>
             <a:endParaRPr lang="en-US"/>
           </a:p>
@@ -2420,7 +2492,7 @@
           <a:p>
             <a:fld id="{05A04CA7-B65A-4CCC-B1AB-F0252503BBAA}" type="datetimeFigureOut">
               <a:rPr lang="en-US" smtClean="0"/>
-              <a:t>6/21/2022</a:t>
+              <a:t>6/22/2022</a:t>
             </a:fld>
             <a:endParaRPr lang="en-US"/>
           </a:p>
@@ -2708,7 +2780,7 @@
           <a:p>
             <a:fld id="{05A04CA7-B65A-4CCC-B1AB-F0252503BBAA}" type="datetimeFigureOut">
               <a:rPr lang="en-US" smtClean="0"/>
-              <a:t>6/21/2022</a:t>
+              <a:t>6/22/2022</a:t>
             </a:fld>
             <a:endParaRPr lang="en-US"/>
           </a:p>
@@ -2949,7 +3021,7 @@
           <a:p>
             <a:fld id="{05A04CA7-B65A-4CCC-B1AB-F0252503BBAA}" type="datetimeFigureOut">
               <a:rPr lang="en-US" smtClean="0"/>
-              <a:t>6/21/2022</a:t>
+              <a:t>6/22/2022</a:t>
             </a:fld>
             <a:endParaRPr lang="en-US"/>
           </a:p>
@@ -3421,8 +3493,8 @@
         </p:nvSpPr>
         <p:spPr>
           <a:xfrm>
-            <a:off x="1532467" y="1016000"/>
-            <a:ext cx="1710266" cy="1754326"/>
+            <a:off x="395329" y="862729"/>
+            <a:ext cx="2441656" cy="2031325"/>
           </a:xfrm>
           <a:prstGeom prst="rect">
             <a:avLst/>
@@ -3442,7 +3514,7 @@
           <a:p>
             <a:r>
               <a:rPr lang="en-US" dirty="0"/>
-              <a:t>Search Criteria:</a:t>
+              <a:t>Select Criteria:</a:t>
             </a:r>
           </a:p>
           <a:p>
@@ -3454,7 +3526,7 @@
           <a:p>
             <a:r>
               <a:rPr lang="en-US" dirty="0"/>
-              <a:t>Account (Category)</a:t>
+              <a:t>Category</a:t>
             </a:r>
           </a:p>
           <a:p>
@@ -3466,6 +3538,12 @@
           <a:p>
             <a:endParaRPr lang="en-US" dirty="0"/>
           </a:p>
+          <a:p>
+            <a:r>
+              <a:rPr lang="en-US" dirty="0"/>
+              <a:t>Select item within selected criteria</a:t>
+            </a:r>
+          </a:p>
         </p:txBody>
       </p:sp>
       <p:sp>
@@ -3482,7 +3560,50 @@
         </p:nvSpPr>
         <p:spPr>
           <a:xfrm>
-            <a:off x="4809067" y="1016000"/>
+            <a:off x="3246967" y="901098"/>
+            <a:ext cx="3505526" cy="923330"/>
+          </a:xfrm>
+          <a:prstGeom prst="rect">
+            <a:avLst/>
+          </a:prstGeom>
+          <a:noFill/>
+          <a:ln>
+            <a:solidFill>
+              <a:schemeClr val="tx1"/>
+            </a:solidFill>
+          </a:ln>
+        </p:spPr>
+        <p:txBody>
+          <a:bodyPr wrap="square" rtlCol="0">
+            <a:spAutoFit/>
+          </a:bodyPr>
+          <a:lstStyle/>
+          <a:p>
+            <a:r>
+              <a:rPr lang="en-US" dirty="0"/>
+              <a:t>Assignee’s qty open tickets and by priority, category, subcategory</a:t>
+            </a:r>
+          </a:p>
+          <a:p>
+            <a:endParaRPr lang="en-US" dirty="0"/>
+          </a:p>
+        </p:txBody>
+      </p:sp>
+      <p:sp>
+        <p:nvSpPr>
+          <p:cNvPr id="7" name="TextBox 6">
+            <a:extLst>
+              <a:ext uri="{FF2B5EF4-FFF2-40B4-BE49-F238E27FC236}">
+                <a16:creationId xmlns:a16="http://schemas.microsoft.com/office/drawing/2014/main" id="{FFFC4487-3653-2D84-44D5-7F7BF9A7AEEC}"/>
+              </a:ext>
+            </a:extLst>
+          </p:cNvPr>
+          <p:cNvSpPr txBox="1"/>
+          <p:nvPr/>
+        </p:nvSpPr>
+        <p:spPr>
+          <a:xfrm>
+            <a:off x="7550640" y="862729"/>
             <a:ext cx="3124200" cy="923330"/>
           </a:xfrm>
           <a:prstGeom prst="rect">
@@ -3503,7 +3624,7 @@
           <a:p>
             <a:r>
               <a:rPr lang="en-US" dirty="0"/>
-              <a:t>Qty open tickets and by category, subcategory</a:t>
+              <a:t>Assignee’s ratings by category, subcategory</a:t>
             </a:r>
           </a:p>
           <a:p>
@@ -3513,10 +3634,10 @@
       </p:sp>
       <p:sp>
         <p:nvSpPr>
-          <p:cNvPr id="7" name="TextBox 6">
-            <a:extLst>
-              <a:ext uri="{FF2B5EF4-FFF2-40B4-BE49-F238E27FC236}">
-                <a16:creationId xmlns:a16="http://schemas.microsoft.com/office/drawing/2014/main" id="{FFFC4487-3653-2D84-44D5-7F7BF9A7AEEC}"/>
+          <p:cNvPr id="8" name="TextBox 7">
+            <a:extLst>
+              <a:ext uri="{FF2B5EF4-FFF2-40B4-BE49-F238E27FC236}">
+                <a16:creationId xmlns:a16="http://schemas.microsoft.com/office/drawing/2014/main" id="{5FF90F39-7B83-339D-4C79-D1519F52CA99}"/>
               </a:ext>
             </a:extLst>
           </p:cNvPr>
@@ -3525,7 +3646,96 @@
         </p:nvSpPr>
         <p:spPr>
           <a:xfrm>
-            <a:off x="8602133" y="1016000"/>
+            <a:off x="4021668" y="4141374"/>
+            <a:ext cx="6917266" cy="369332"/>
+          </a:xfrm>
+          <a:prstGeom prst="rect">
+            <a:avLst/>
+          </a:prstGeom>
+          <a:noFill/>
+          <a:ln>
+            <a:solidFill>
+              <a:schemeClr val="tx1"/>
+            </a:solidFill>
+          </a:ln>
+        </p:spPr>
+        <p:txBody>
+          <a:bodyPr wrap="square" rtlCol="0">
+            <a:spAutoFit/>
+          </a:bodyPr>
+          <a:lstStyle/>
+          <a:p>
+            <a:r>
+              <a:rPr lang="en-US" dirty="0"/>
+              <a:t>List of open/closed tickets</a:t>
+            </a:r>
+          </a:p>
+        </p:txBody>
+      </p:sp>
+      <p:sp>
+        <p:nvSpPr>
+          <p:cNvPr id="9" name="TextBox 8">
+            <a:extLst>
+              <a:ext uri="{FF2B5EF4-FFF2-40B4-BE49-F238E27FC236}">
+                <a16:creationId xmlns:a16="http://schemas.microsoft.com/office/drawing/2014/main" id="{44B0FA42-7AC8-EBE1-7C70-81CDE9B94637}"/>
+              </a:ext>
+            </a:extLst>
+          </p:cNvPr>
+          <p:cNvSpPr txBox="1"/>
+          <p:nvPr/>
+        </p:nvSpPr>
+        <p:spPr>
+          <a:xfrm>
+            <a:off x="4370755" y="3007632"/>
+            <a:ext cx="3832468" cy="1200329"/>
+          </a:xfrm>
+          <a:prstGeom prst="rect">
+            <a:avLst/>
+          </a:prstGeom>
+          <a:noFill/>
+          <a:ln>
+            <a:solidFill>
+              <a:schemeClr val="tx1"/>
+            </a:solidFill>
+          </a:ln>
+        </p:spPr>
+        <p:txBody>
+          <a:bodyPr wrap="square" rtlCol="0">
+            <a:spAutoFit/>
+          </a:bodyPr>
+          <a:lstStyle/>
+          <a:p>
+            <a:r>
+              <a:rPr lang="en-US" dirty="0"/>
+              <a:t>Categories qty open tickets by subcategory and bins for days open</a:t>
+            </a:r>
+          </a:p>
+          <a:p>
+            <a:r>
+              <a:rPr lang="en-US" dirty="0"/>
+              <a:t>For all tickets</a:t>
+            </a:r>
+          </a:p>
+          <a:p>
+            <a:endParaRPr lang="en-US" dirty="0"/>
+          </a:p>
+        </p:txBody>
+      </p:sp>
+      <p:sp>
+        <p:nvSpPr>
+          <p:cNvPr id="10" name="TextBox 9">
+            <a:extLst>
+              <a:ext uri="{FF2B5EF4-FFF2-40B4-BE49-F238E27FC236}">
+                <a16:creationId xmlns:a16="http://schemas.microsoft.com/office/drawing/2014/main" id="{48D31BD1-11D2-4ED6-CFE3-D352C9C02BA5}"/>
+              </a:ext>
+            </a:extLst>
+          </p:cNvPr>
+          <p:cNvSpPr txBox="1"/>
+          <p:nvPr/>
+        </p:nvSpPr>
+        <p:spPr>
+          <a:xfrm>
+            <a:off x="7550640" y="2034840"/>
             <a:ext cx="3124200" cy="923330"/>
           </a:xfrm>
           <a:prstGeom prst="rect">
@@ -3546,7 +3756,7 @@
           <a:p>
             <a:r>
               <a:rPr lang="en-US" dirty="0"/>
-              <a:t>Qty closed tickets and by category, subcategory</a:t>
+              <a:t>Assignee’s qty open tickets by bins for days open</a:t>
             </a:r>
           </a:p>
           <a:p>
@@ -3556,10 +3766,10 @@
       </p:sp>
       <p:sp>
         <p:nvSpPr>
-          <p:cNvPr id="8" name="TextBox 7">
-            <a:extLst>
-              <a:ext uri="{FF2B5EF4-FFF2-40B4-BE49-F238E27FC236}">
-                <a16:creationId xmlns:a16="http://schemas.microsoft.com/office/drawing/2014/main" id="{5FF90F39-7B83-339D-4C79-D1519F52CA99}"/>
+          <p:cNvPr id="11" name="TextBox 10">
+            <a:extLst>
+              <a:ext uri="{FF2B5EF4-FFF2-40B4-BE49-F238E27FC236}">
+                <a16:creationId xmlns:a16="http://schemas.microsoft.com/office/drawing/2014/main" id="{26EA380F-D5A3-2694-FBC5-992B761B3332}"/>
               </a:ext>
             </a:extLst>
           </p:cNvPr>
@@ -3568,8 +3778,8 @@
         </p:nvSpPr>
         <p:spPr>
           <a:xfrm>
-            <a:off x="4809067" y="2405797"/>
-            <a:ext cx="6917266" cy="1200329"/>
+            <a:off x="3246967" y="2065623"/>
+            <a:ext cx="3124200" cy="923330"/>
           </a:xfrm>
           <a:prstGeom prst="rect">
             <a:avLst/>
@@ -3589,19 +3799,89 @@
           <a:p>
             <a:r>
               <a:rPr lang="en-US" dirty="0"/>
-              <a:t>List of open/closed tickets by assignee</a:t>
-            </a:r>
-          </a:p>
+              <a:t>Assignee’s qty open tickets by bins for days open</a:t>
+            </a:r>
+          </a:p>
+          <a:p>
+            <a:endParaRPr lang="en-US" dirty="0"/>
+          </a:p>
+        </p:txBody>
+      </p:sp>
+      <p:sp>
+        <p:nvSpPr>
+          <p:cNvPr id="12" name="TextBox 11">
+            <a:extLst>
+              <a:ext uri="{FF2B5EF4-FFF2-40B4-BE49-F238E27FC236}">
+                <a16:creationId xmlns:a16="http://schemas.microsoft.com/office/drawing/2014/main" id="{7E9D09D1-8FD0-AD21-CC60-38C2FCCC81B6}"/>
+              </a:ext>
+            </a:extLst>
+          </p:cNvPr>
+          <p:cNvSpPr txBox="1"/>
+          <p:nvPr/>
+        </p:nvSpPr>
+        <p:spPr>
+          <a:xfrm>
+            <a:off x="369275" y="4141374"/>
+            <a:ext cx="2991991" cy="2585323"/>
+          </a:xfrm>
+          <a:prstGeom prst="rect">
+            <a:avLst/>
+          </a:prstGeom>
+          <a:noFill/>
+          <a:ln>
+            <a:solidFill>
+              <a:schemeClr val="tx1"/>
+            </a:solidFill>
+          </a:ln>
+        </p:spPr>
+        <p:txBody>
+          <a:bodyPr wrap="square" rtlCol="0">
+            <a:spAutoFit/>
+          </a:bodyPr>
+          <a:lstStyle/>
           <a:p>
             <a:r>
               <a:rPr lang="en-US" dirty="0"/>
-              <a:t>List of open/closed tickets by account</a:t>
+              <a:t>Search Criteria:</a:t>
             </a:r>
           </a:p>
           <a:p>
             <a:r>
               <a:rPr lang="en-US" dirty="0"/>
-              <a:t>List of open/closed tickets by subcategory</a:t>
+              <a:t>Assignee</a:t>
+            </a:r>
+          </a:p>
+          <a:p>
+            <a:r>
+              <a:rPr lang="en-US" dirty="0"/>
+              <a:t>Category</a:t>
+            </a:r>
+          </a:p>
+          <a:p>
+            <a:r>
+              <a:rPr lang="en-US" dirty="0"/>
+              <a:t>Subcategory</a:t>
+            </a:r>
+          </a:p>
+          <a:p>
+            <a:endParaRPr lang="en-US" dirty="0"/>
+          </a:p>
+          <a:p>
+            <a:r>
+              <a:rPr lang="en-US" dirty="0"/>
+              <a:t>Specify:</a:t>
+            </a:r>
+          </a:p>
+          <a:p>
+            <a:r>
+              <a:rPr lang="en-US" dirty="0"/>
+              <a:t>Open</a:t>
+            </a:r>
+          </a:p>
+          <a:p>
+            <a:r>
+              <a:rPr lang="en-US" dirty="0"/>
+              <a:t>Closed</a:t>
             </a:r>
           </a:p>
           <a:p>

</xml_diff>